<commit_message>
Added Dan and Joes combined slides
</commit_message>
<xml_diff>
--- a/Assignment7/Group2_Presentation_Cell2CellPart2.pptx
+++ b/Assignment7/Group2_Presentation_Cell2CellPart2.pptx
@@ -5,32 +5,33 @@
     <p:sldMasterId id="2147483648" r:id="rId1"/>
   </p:sldMasterIdLst>
   <p:notesMasterIdLst>
-    <p:notesMasterId r:id="rId17"/>
+    <p:notesMasterId r:id="rId18"/>
   </p:notesMasterIdLst>
   <p:handoutMasterIdLst>
-    <p:handoutMasterId r:id="rId18"/>
+    <p:handoutMasterId r:id="rId19"/>
   </p:handoutMasterIdLst>
   <p:sldIdLst>
     <p:sldId id="265" r:id="rId2"/>
     <p:sldId id="310" r:id="rId3"/>
-    <p:sldId id="320" r:id="rId4"/>
-    <p:sldId id="321" r:id="rId5"/>
-    <p:sldId id="322" r:id="rId6"/>
-    <p:sldId id="323" r:id="rId7"/>
-    <p:sldId id="311" r:id="rId8"/>
-    <p:sldId id="313" r:id="rId9"/>
-    <p:sldId id="312" r:id="rId10"/>
-    <p:sldId id="314" r:id="rId11"/>
-    <p:sldId id="315" r:id="rId12"/>
-    <p:sldId id="316" r:id="rId13"/>
-    <p:sldId id="317" r:id="rId14"/>
-    <p:sldId id="318" r:id="rId15"/>
-    <p:sldId id="319" r:id="rId16"/>
+    <p:sldId id="324" r:id="rId4"/>
+    <p:sldId id="320" r:id="rId5"/>
+    <p:sldId id="321" r:id="rId6"/>
+    <p:sldId id="322" r:id="rId7"/>
+    <p:sldId id="323" r:id="rId8"/>
+    <p:sldId id="311" r:id="rId9"/>
+    <p:sldId id="313" r:id="rId10"/>
+    <p:sldId id="312" r:id="rId11"/>
+    <p:sldId id="314" r:id="rId12"/>
+    <p:sldId id="315" r:id="rId13"/>
+    <p:sldId id="316" r:id="rId14"/>
+    <p:sldId id="317" r:id="rId15"/>
+    <p:sldId id="318" r:id="rId16"/>
+    <p:sldId id="319" r:id="rId17"/>
   </p:sldIdLst>
   <p:sldSz cx="12188825" cy="6858000"/>
   <p:notesSz cx="6858000" cy="9144000"/>
   <p:custDataLst>
-    <p:tags r:id="rId19"/>
+    <p:tags r:id="rId20"/>
   </p:custDataLst>
   <p:defaultTextStyle>
     <a:defPPr>
@@ -159,6 +160,277 @@
     </p:extLst>
   </p:cmAuthor>
 </p:cmAuthorLst>
+</file>
+
+<file path=ppt/revisionInfo.xml><?xml version="1.0" encoding="utf-8"?>
+<p1510:revInfo xmlns:a="http://schemas.openxmlformats.org/drawingml/2006/main" xmlns:r="http://schemas.openxmlformats.org/officeDocument/2006/relationships" xmlns:p1510="http://schemas.microsoft.com/office/powerpoint/2015/10/main">
+  <p1510:revLst>
+    <p1510:client id="{513A445A-63E1-4BD5-8CDE-559B791AA216}" v="40" dt="2019-05-05T00:17:46.385"/>
+  </p1510:revLst>
+</p1510:revInfo>
+</file>
+
+<file path=ppt/changesInfos/changesInfo1.xml><?xml version="1.0" encoding="utf-8"?>
+<pc:chgInfo xmlns:a="http://schemas.openxmlformats.org/drawingml/2006/main" xmlns:r="http://schemas.openxmlformats.org/officeDocument/2006/relationships" xmlns:ac="http://schemas.microsoft.com/office/drawing/2013/main/command" xmlns:pc="http://schemas.microsoft.com/office/powerpoint/2013/main/command">
+  <pc:docChgLst>
+    <pc:chgData name="joe standerfer" userId="1b337ce15d3046a8" providerId="LiveId" clId="{513A445A-63E1-4BD5-8CDE-559B791AA216}"/>
+    <pc:docChg chg="undo redo custSel addSld delSld modSld">
+      <pc:chgData name="joe standerfer" userId="1b337ce15d3046a8" providerId="LiveId" clId="{513A445A-63E1-4BD5-8CDE-559B791AA216}" dt="2019-05-05T00:18:29.129" v="81" actId="2696"/>
+      <pc:docMkLst>
+        <pc:docMk/>
+      </pc:docMkLst>
+      <pc:sldChg chg="addSp modSp">
+        <pc:chgData name="joe standerfer" userId="1b337ce15d3046a8" providerId="LiveId" clId="{513A445A-63E1-4BD5-8CDE-559B791AA216}" dt="2019-05-05T00:14:55.655" v="27" actId="1076"/>
+        <pc:sldMkLst>
+          <pc:docMk/>
+          <pc:sldMk cId="4153531223" sldId="320"/>
+        </pc:sldMkLst>
+        <pc:graphicFrameChg chg="mod">
+          <ac:chgData name="joe standerfer" userId="1b337ce15d3046a8" providerId="LiveId" clId="{513A445A-63E1-4BD5-8CDE-559B791AA216}" dt="2019-05-05T00:14:45.058" v="25" actId="1037"/>
+          <ac:graphicFrameMkLst>
+            <pc:docMk/>
+            <pc:sldMk cId="4153531223" sldId="320"/>
+            <ac:graphicFrameMk id="3" creationId="{00000000-0000-0000-0000-000000000000}"/>
+          </ac:graphicFrameMkLst>
+        </pc:graphicFrameChg>
+        <pc:picChg chg="add mod">
+          <ac:chgData name="joe standerfer" userId="1b337ce15d3046a8" providerId="LiveId" clId="{513A445A-63E1-4BD5-8CDE-559B791AA216}" dt="2019-05-05T00:14:55.655" v="27" actId="1076"/>
+          <ac:picMkLst>
+            <pc:docMk/>
+            <pc:sldMk cId="4153531223" sldId="320"/>
+            <ac:picMk id="4" creationId="{3BC0109A-AF8F-4C1D-9FE5-AC5826C2CD88}"/>
+          </ac:picMkLst>
+        </pc:picChg>
+      </pc:sldChg>
+      <pc:sldChg chg="addSp delSp modSp">
+        <pc:chgData name="joe standerfer" userId="1b337ce15d3046a8" providerId="LiveId" clId="{513A445A-63E1-4BD5-8CDE-559B791AA216}" dt="2019-05-05T00:18:17.030" v="78" actId="1076"/>
+        <pc:sldMkLst>
+          <pc:docMk/>
+          <pc:sldMk cId="4232054341" sldId="321"/>
+        </pc:sldMkLst>
+        <pc:spChg chg="mod">
+          <ac:chgData name="joe standerfer" userId="1b337ce15d3046a8" providerId="LiveId" clId="{513A445A-63E1-4BD5-8CDE-559B791AA216}" dt="2019-05-05T00:18:17.030" v="78" actId="1076"/>
+          <ac:spMkLst>
+            <pc:docMk/>
+            <pc:sldMk cId="4232054341" sldId="321"/>
+            <ac:spMk id="2" creationId="{EC0C1A80-D457-4EC9-8BDC-9C74A91D2866}"/>
+          </ac:spMkLst>
+        </pc:spChg>
+        <pc:spChg chg="mod">
+          <ac:chgData name="joe standerfer" userId="1b337ce15d3046a8" providerId="LiveId" clId="{513A445A-63E1-4BD5-8CDE-559B791AA216}" dt="2019-05-05T00:15:26.930" v="42" actId="20577"/>
+          <ac:spMkLst>
+            <pc:docMk/>
+            <pc:sldMk cId="4232054341" sldId="321"/>
+            <ac:spMk id="13" creationId="{00000000-0000-0000-0000-000000000000}"/>
+          </ac:spMkLst>
+        </pc:spChg>
+        <pc:grpChg chg="add del mod">
+          <ac:chgData name="joe standerfer" userId="1b337ce15d3046a8" providerId="LiveId" clId="{513A445A-63E1-4BD5-8CDE-559B791AA216}" dt="2019-05-05T00:17:40.295" v="67"/>
+          <ac:grpSpMkLst>
+            <pc:docMk/>
+            <pc:sldMk cId="4232054341" sldId="321"/>
+            <ac:grpSpMk id="6" creationId="{CADF5635-BC62-4C55-8305-A8F5BE5A9B46}"/>
+          </ac:grpSpMkLst>
+        </pc:grpChg>
+        <pc:graphicFrameChg chg="mod">
+          <ac:chgData name="joe standerfer" userId="1b337ce15d3046a8" providerId="LiveId" clId="{513A445A-63E1-4BD5-8CDE-559B791AA216}" dt="2019-05-05T00:15:15.899" v="41" actId="1037"/>
+          <ac:graphicFrameMkLst>
+            <pc:docMk/>
+            <pc:sldMk cId="4232054341" sldId="321"/>
+            <ac:graphicFrameMk id="3" creationId="{00000000-0000-0000-0000-000000000000}"/>
+          </ac:graphicFrameMkLst>
+        </pc:graphicFrameChg>
+        <pc:picChg chg="add mod ord">
+          <ac:chgData name="joe standerfer" userId="1b337ce15d3046a8" providerId="LiveId" clId="{513A445A-63E1-4BD5-8CDE-559B791AA216}" dt="2019-05-05T00:18:07.488" v="76" actId="167"/>
+          <ac:picMkLst>
+            <pc:docMk/>
+            <pc:sldMk cId="4232054341" sldId="321"/>
+            <ac:picMk id="4" creationId="{980FB3C1-BE6F-4E4B-90D4-BBE9FBC5DB55}"/>
+          </ac:picMkLst>
+        </pc:picChg>
+        <pc:picChg chg="add del">
+          <ac:chgData name="joe standerfer" userId="1b337ce15d3046a8" providerId="LiveId" clId="{513A445A-63E1-4BD5-8CDE-559B791AA216}" dt="2019-05-05T00:18:09.200" v="77" actId="478"/>
+          <ac:picMkLst>
+            <pc:docMk/>
+            <pc:sldMk cId="4232054341" sldId="321"/>
+            <ac:picMk id="5" creationId="{9145D55E-C178-487A-B1A3-8C5A79834DB2}"/>
+          </ac:picMkLst>
+        </pc:picChg>
+      </pc:sldChg>
+      <pc:sldChg chg="addSp delSp modSp">
+        <pc:chgData name="joe standerfer" userId="1b337ce15d3046a8" providerId="LiveId" clId="{513A445A-63E1-4BD5-8CDE-559B791AA216}" dt="2019-05-05T00:17:07.649" v="63" actId="478"/>
+        <pc:sldMkLst>
+          <pc:docMk/>
+          <pc:sldMk cId="2063257227" sldId="322"/>
+        </pc:sldMkLst>
+        <pc:spChg chg="mod">
+          <ac:chgData name="joe standerfer" userId="1b337ce15d3046a8" providerId="LiveId" clId="{513A445A-63E1-4BD5-8CDE-559B791AA216}" dt="2019-05-05T00:15:30.692" v="43" actId="20577"/>
+          <ac:spMkLst>
+            <pc:docMk/>
+            <pc:sldMk cId="2063257227" sldId="322"/>
+            <ac:spMk id="13" creationId="{00000000-0000-0000-0000-000000000000}"/>
+          </ac:spMkLst>
+        </pc:spChg>
+        <pc:grpChg chg="add del mod">
+          <ac:chgData name="joe standerfer" userId="1b337ce15d3046a8" providerId="LiveId" clId="{513A445A-63E1-4BD5-8CDE-559B791AA216}" dt="2019-05-05T00:16:30.706" v="57"/>
+          <ac:grpSpMkLst>
+            <pc:docMk/>
+            <pc:sldMk cId="2063257227" sldId="322"/>
+            <ac:grpSpMk id="6" creationId="{B4603052-02D2-41BF-B8D7-B9D3FB1A295B}"/>
+          </ac:grpSpMkLst>
+        </pc:grpChg>
+        <pc:graphicFrameChg chg="mod">
+          <ac:chgData name="joe standerfer" userId="1b337ce15d3046a8" providerId="LiveId" clId="{513A445A-63E1-4BD5-8CDE-559B791AA216}" dt="2019-05-05T00:15:08.570" v="35" actId="1037"/>
+          <ac:graphicFrameMkLst>
+            <pc:docMk/>
+            <pc:sldMk cId="2063257227" sldId="322"/>
+            <ac:graphicFrameMk id="3" creationId="{00000000-0000-0000-0000-000000000000}"/>
+          </ac:graphicFrameMkLst>
+        </pc:graphicFrameChg>
+        <pc:picChg chg="add mod ord">
+          <ac:chgData name="joe standerfer" userId="1b337ce15d3046a8" providerId="LiveId" clId="{513A445A-63E1-4BD5-8CDE-559B791AA216}" dt="2019-05-05T00:17:05.547" v="62" actId="167"/>
+          <ac:picMkLst>
+            <pc:docMk/>
+            <pc:sldMk cId="2063257227" sldId="322"/>
+            <ac:picMk id="4" creationId="{2369E768-4B41-4D89-AFBA-F649EADE7A38}"/>
+          </ac:picMkLst>
+        </pc:picChg>
+        <pc:picChg chg="add del">
+          <ac:chgData name="joe standerfer" userId="1b337ce15d3046a8" providerId="LiveId" clId="{513A445A-63E1-4BD5-8CDE-559B791AA216}" dt="2019-05-05T00:17:07.649" v="63" actId="478"/>
+          <ac:picMkLst>
+            <pc:docMk/>
+            <pc:sldMk cId="2063257227" sldId="322"/>
+            <ac:picMk id="5" creationId="{F45DA4E6-96DB-4250-B037-441604E08EDC}"/>
+          </ac:picMkLst>
+        </pc:picChg>
+      </pc:sldChg>
+      <pc:sldChg chg="add">
+        <pc:chgData name="joe standerfer" userId="1b337ce15d3046a8" providerId="LiveId" clId="{513A445A-63E1-4BD5-8CDE-559B791AA216}" dt="2019-05-05T00:13:33.252" v="0"/>
+        <pc:sldMkLst>
+          <pc:docMk/>
+          <pc:sldMk cId="312347104" sldId="324"/>
+        </pc:sldMkLst>
+      </pc:sldChg>
+      <pc:sldChg chg="addSp modSp add del">
+        <pc:chgData name="joe standerfer" userId="1b337ce15d3046a8" providerId="LiveId" clId="{513A445A-63E1-4BD5-8CDE-559B791AA216}" dt="2019-05-05T00:18:26.346" v="79" actId="2696"/>
+        <pc:sldMkLst>
+          <pc:docMk/>
+          <pc:sldMk cId="1589070892" sldId="325"/>
+        </pc:sldMkLst>
+        <pc:spChg chg="mod">
+          <ac:chgData name="joe standerfer" userId="1b337ce15d3046a8" providerId="LiveId" clId="{513A445A-63E1-4BD5-8CDE-559B791AA216}" dt="2019-05-05T00:13:47.534" v="2" actId="1076"/>
+          <ac:spMkLst>
+            <pc:docMk/>
+            <pc:sldMk cId="1589070892" sldId="325"/>
+            <ac:spMk id="3" creationId="{612E3CF4-E157-4A32-B84D-EE54E327BA14}"/>
+          </ac:spMkLst>
+        </pc:spChg>
+        <pc:spChg chg="mod">
+          <ac:chgData name="joe standerfer" userId="1b337ce15d3046a8" providerId="LiveId" clId="{513A445A-63E1-4BD5-8CDE-559B791AA216}" dt="2019-05-05T00:14:02.131" v="5" actId="164"/>
+          <ac:spMkLst>
+            <pc:docMk/>
+            <pc:sldMk cId="1589070892" sldId="325"/>
+            <ac:spMk id="18" creationId="{74AB3C21-6386-421F-8B9C-582FB590CBFD}"/>
+          </ac:spMkLst>
+        </pc:spChg>
+        <pc:grpChg chg="add mod">
+          <ac:chgData name="joe standerfer" userId="1b337ce15d3046a8" providerId="LiveId" clId="{513A445A-63E1-4BD5-8CDE-559B791AA216}" dt="2019-05-05T00:14:02.131" v="5" actId="164"/>
+          <ac:grpSpMkLst>
+            <pc:docMk/>
+            <pc:sldMk cId="1589070892" sldId="325"/>
+            <ac:grpSpMk id="2" creationId="{B864CC72-C61A-421E-833D-A24D604548F6}"/>
+          </ac:grpSpMkLst>
+        </pc:grpChg>
+        <pc:grpChg chg="mod">
+          <ac:chgData name="joe standerfer" userId="1b337ce15d3046a8" providerId="LiveId" clId="{513A445A-63E1-4BD5-8CDE-559B791AA216}" dt="2019-05-05T00:14:02.131" v="5" actId="164"/>
+          <ac:grpSpMkLst>
+            <pc:docMk/>
+            <pc:sldMk cId="1589070892" sldId="325"/>
+            <ac:grpSpMk id="12" creationId="{C08B66E1-37D5-4DFE-9329-31A8FB419AC3}"/>
+          </ac:grpSpMkLst>
+        </pc:grpChg>
+      </pc:sldChg>
+      <pc:sldChg chg="addSp modSp add del">
+        <pc:chgData name="joe standerfer" userId="1b337ce15d3046a8" providerId="LiveId" clId="{513A445A-63E1-4BD5-8CDE-559B791AA216}" dt="2019-05-05T00:18:28.258" v="80" actId="2696"/>
+        <pc:sldMkLst>
+          <pc:docMk/>
+          <pc:sldMk cId="1588878415" sldId="326"/>
+        </pc:sldMkLst>
+        <pc:spChg chg="mod">
+          <ac:chgData name="joe standerfer" userId="1b337ce15d3046a8" providerId="LiveId" clId="{513A445A-63E1-4BD5-8CDE-559B791AA216}" dt="2019-05-05T00:15:44.191" v="44" actId="164"/>
+          <ac:spMkLst>
+            <pc:docMk/>
+            <pc:sldMk cId="1588878415" sldId="326"/>
+            <ac:spMk id="11" creationId="{023D53DA-B1C1-4192-8715-923B581047A9}"/>
+          </ac:spMkLst>
+        </pc:spChg>
+        <pc:spChg chg="mod">
+          <ac:chgData name="joe standerfer" userId="1b337ce15d3046a8" providerId="LiveId" clId="{513A445A-63E1-4BD5-8CDE-559B791AA216}" dt="2019-05-05T00:15:44.191" v="44" actId="164"/>
+          <ac:spMkLst>
+            <pc:docMk/>
+            <pc:sldMk cId="1588878415" sldId="326"/>
+            <ac:spMk id="18" creationId="{74AB3C21-6386-421F-8B9C-582FB590CBFD}"/>
+          </ac:spMkLst>
+        </pc:spChg>
+        <pc:grpChg chg="add mod">
+          <ac:chgData name="joe standerfer" userId="1b337ce15d3046a8" providerId="LiveId" clId="{513A445A-63E1-4BD5-8CDE-559B791AA216}" dt="2019-05-05T00:15:44.191" v="44" actId="164"/>
+          <ac:grpSpMkLst>
+            <pc:docMk/>
+            <pc:sldMk cId="1588878415" sldId="326"/>
+            <ac:grpSpMk id="2" creationId="{68EC05CD-5D6D-4784-B0E6-F48D8925479D}"/>
+          </ac:grpSpMkLst>
+        </pc:grpChg>
+        <pc:grpChg chg="mod">
+          <ac:chgData name="joe standerfer" userId="1b337ce15d3046a8" providerId="LiveId" clId="{513A445A-63E1-4BD5-8CDE-559B791AA216}" dt="2019-05-05T00:15:44.191" v="44" actId="164"/>
+          <ac:grpSpMkLst>
+            <pc:docMk/>
+            <pc:sldMk cId="1588878415" sldId="326"/>
+            <ac:grpSpMk id="12" creationId="{C08B66E1-37D5-4DFE-9329-31A8FB419AC3}"/>
+          </ac:grpSpMkLst>
+        </pc:grpChg>
+      </pc:sldChg>
+      <pc:sldChg chg="addSp modSp add del">
+        <pc:chgData name="joe standerfer" userId="1b337ce15d3046a8" providerId="LiveId" clId="{513A445A-63E1-4BD5-8CDE-559B791AA216}" dt="2019-05-05T00:18:29.129" v="81" actId="2696"/>
+        <pc:sldMkLst>
+          <pc:docMk/>
+          <pc:sldMk cId="4226711434" sldId="327"/>
+        </pc:sldMkLst>
+        <pc:spChg chg="mod">
+          <ac:chgData name="joe standerfer" userId="1b337ce15d3046a8" providerId="LiveId" clId="{513A445A-63E1-4BD5-8CDE-559B791AA216}" dt="2019-05-05T00:15:52.454" v="45" actId="164"/>
+          <ac:spMkLst>
+            <pc:docMk/>
+            <pc:sldMk cId="4226711434" sldId="327"/>
+            <ac:spMk id="11" creationId="{5BDC561B-1019-44B6-BC6B-0444E184A935}"/>
+          </ac:spMkLst>
+        </pc:spChg>
+        <pc:grpChg chg="add mod">
+          <ac:chgData name="joe standerfer" userId="1b337ce15d3046a8" providerId="LiveId" clId="{513A445A-63E1-4BD5-8CDE-559B791AA216}" dt="2019-05-05T00:15:52.454" v="45" actId="164"/>
+          <ac:grpSpMkLst>
+            <pc:docMk/>
+            <pc:sldMk cId="4226711434" sldId="327"/>
+            <ac:grpSpMk id="5" creationId="{08651B89-E24C-4842-A1E0-194637B6BE42}"/>
+          </ac:grpSpMkLst>
+        </pc:grpChg>
+        <pc:grpChg chg="mod">
+          <ac:chgData name="joe standerfer" userId="1b337ce15d3046a8" providerId="LiveId" clId="{513A445A-63E1-4BD5-8CDE-559B791AA216}" dt="2019-05-05T00:15:52.454" v="45" actId="164"/>
+          <ac:grpSpMkLst>
+            <pc:docMk/>
+            <pc:sldMk cId="4226711434" sldId="327"/>
+            <ac:grpSpMk id="7" creationId="{AEAD7E72-8D87-40BC-BFF4-C98DB75A9962}"/>
+          </ac:grpSpMkLst>
+        </pc:grpChg>
+        <pc:grpChg chg="mod">
+          <ac:chgData name="joe standerfer" userId="1b337ce15d3046a8" providerId="LiveId" clId="{513A445A-63E1-4BD5-8CDE-559B791AA216}" dt="2019-05-05T00:15:52.454" v="45" actId="164"/>
+          <ac:grpSpMkLst>
+            <pc:docMk/>
+            <pc:sldMk cId="4226711434" sldId="327"/>
+            <ac:grpSpMk id="12" creationId="{C08B66E1-37D5-4DFE-9329-31A8FB419AC3}"/>
+          </ac:grpSpMkLst>
+        </pc:grpChg>
+      </pc:sldChg>
+    </pc:docChg>
+  </pc:docChgLst>
+</pc:chgInfo>
 </file>
 
 <file path=ppt/charts/chart1.xml><?xml version="1.0" encoding="utf-8"?>
@@ -5278,7 +5550,7 @@
   <dgm:whole/>
   <dgm:extLst>
     <a:ext uri="http://schemas.microsoft.com/office/drawing/2008/diagram">
-      <dsp:dataModelExt xmlns:dsp="http://schemas.microsoft.com/office/drawing/2008/diagram" relId="rId6" minVer="http://schemas.openxmlformats.org/drawingml/2006/diagram"/>
+      <dsp:dataModelExt xmlns:dsp="http://schemas.microsoft.com/office/drawing/2008/diagram" relId="rId7" minVer="http://schemas.openxmlformats.org/drawingml/2006/diagram"/>
     </a:ext>
   </dgm:extLst>
 </dgm:dataModel>
@@ -5855,7 +6127,7 @@
   <dgm:whole/>
   <dgm:extLst>
     <a:ext uri="http://schemas.microsoft.com/office/drawing/2008/diagram">
-      <dsp:dataModelExt xmlns:dsp="http://schemas.microsoft.com/office/drawing/2008/diagram" relId="rId6" minVer="http://schemas.openxmlformats.org/drawingml/2006/diagram"/>
+      <dsp:dataModelExt xmlns:dsp="http://schemas.microsoft.com/office/drawing/2008/diagram" relId="rId7" minVer="http://schemas.openxmlformats.org/drawingml/2006/diagram"/>
     </a:ext>
   </dgm:extLst>
 </dgm:dataModel>
@@ -19409,6 +19681,95 @@
       </p:grpSpPr>
       <p:sp>
         <p:nvSpPr>
+          <p:cNvPr id="13" name="Title 12"/>
+          <p:cNvSpPr>
+            <a:spLocks noGrp="1"/>
+          </p:cNvSpPr>
+          <p:nvPr>
+            <p:ph type="title"/>
+          </p:nvPr>
+        </p:nvSpPr>
+        <p:spPr/>
+        <p:txBody>
+          <a:bodyPr/>
+          <a:lstStyle/>
+          <a:p>
+            <a:r>
+              <a:rPr lang="en-US" dirty="0"/>
+              <a:t>Title and Content Layout with SmartArt</a:t>
+            </a:r>
+          </a:p>
+        </p:txBody>
+      </p:sp>
+      <p:graphicFrame>
+        <p:nvGraphicFramePr>
+          <p:cNvPr id="3" name="Content Placeholder 2" descr="Alternating Flow diagram showing 3 groups arranged from left to right with a title and bullet points in each group and a curved arrow showing the flow from one group to the next."/>
+          <p:cNvGraphicFramePr>
+            <a:graphicFrameLocks noGrp="1"/>
+          </p:cNvGraphicFramePr>
+          <p:nvPr>
+            <p:ph idx="1"/>
+            <p:extLst>
+              <p:ext uri="{D42A27DB-BD31-4B8C-83A1-F6EECF244321}">
+                <p14:modId xmlns:p14="http://schemas.microsoft.com/office/powerpoint/2010/main" val="2718408119"/>
+              </p:ext>
+            </p:extLst>
+          </p:nvPr>
+        </p:nvGraphicFramePr>
+        <p:xfrm>
+          <a:off x="1522413" y="1905000"/>
+          <a:ext cx="9134475" cy="4114800"/>
+        </p:xfrm>
+        <a:graphic>
+          <a:graphicData uri="http://schemas.openxmlformats.org/drawingml/2006/diagram">
+            <dgm:relIds xmlns:dgm="http://schemas.openxmlformats.org/drawingml/2006/diagram" xmlns:r="http://schemas.openxmlformats.org/officeDocument/2006/relationships" r:dm="rId2" r:lo="rId3" r:qs="rId4" r:cs="rId5"/>
+          </a:graphicData>
+        </a:graphic>
+      </p:graphicFrame>
+    </p:spTree>
+    <p:extLst>
+      <p:ext uri="{BB962C8B-B14F-4D97-AF65-F5344CB8AC3E}">
+        <p14:creationId xmlns:p14="http://schemas.microsoft.com/office/powerpoint/2010/main" val="462238070"/>
+      </p:ext>
+    </p:extLst>
+  </p:cSld>
+  <p:clrMapOvr>
+    <a:masterClrMapping/>
+  </p:clrMapOvr>
+  <mc:AlternateContent xmlns:mc="http://schemas.openxmlformats.org/markup-compatibility/2006" xmlns:p14="http://schemas.microsoft.com/office/powerpoint/2010/main">
+    <mc:Choice Requires="p14">
+      <p:transition spd="med" p14:dur="700">
+        <p:fade/>
+      </p:transition>
+    </mc:Choice>
+    <mc:Fallback xmlns="">
+      <p:transition spd="med">
+        <p:fade/>
+      </p:transition>
+    </mc:Fallback>
+  </mc:AlternateContent>
+</p:sld>
+</file>
+
+<file path=ppt/slides/slide11.xml><?xml version="1.0" encoding="utf-8"?>
+<p:sld xmlns:a="http://schemas.openxmlformats.org/drawingml/2006/main" xmlns:r="http://schemas.openxmlformats.org/officeDocument/2006/relationships" xmlns:p="http://schemas.openxmlformats.org/presentationml/2006/main">
+  <p:cSld>
+    <p:spTree>
+      <p:nvGrpSpPr>
+        <p:cNvPr id="1" name=""/>
+        <p:cNvGrpSpPr/>
+        <p:nvPr/>
+      </p:nvGrpSpPr>
+      <p:grpSpPr>
+        <a:xfrm>
+          <a:off x="0" y="0"/>
+          <a:ext cx="0" cy="0"/>
+          <a:chOff x="0" y="0"/>
+          <a:chExt cx="0" cy="0"/>
+        </a:xfrm>
+      </p:grpSpPr>
+      <p:sp>
+        <p:nvSpPr>
           <p:cNvPr id="2" name="Title 1"/>
           <p:cNvSpPr>
             <a:spLocks noGrp="1"/>
@@ -19473,7 +19834,7 @@
 </p:sld>
 </file>
 
-<file path=ppt/slides/slide11.xml><?xml version="1.0" encoding="utf-8"?>
+<file path=ppt/slides/slide12.xml><?xml version="1.0" encoding="utf-8"?>
 <p:sld xmlns:a="http://schemas.openxmlformats.org/drawingml/2006/main" xmlns:r="http://schemas.openxmlformats.org/officeDocument/2006/relationships" xmlns:p="http://schemas.openxmlformats.org/presentationml/2006/main">
   <p:cSld>
     <p:spTree>
@@ -19613,7 +19974,7 @@
 </p:sld>
 </file>
 
-<file path=ppt/slides/slide12.xml><?xml version="1.0" encoding="utf-8"?>
+<file path=ppt/slides/slide13.xml><?xml version="1.0" encoding="utf-8"?>
 <p:sld xmlns:a="http://schemas.openxmlformats.org/drawingml/2006/main" xmlns:r="http://schemas.openxmlformats.org/officeDocument/2006/relationships" xmlns:p="http://schemas.openxmlformats.org/presentationml/2006/main">
   <p:cSld>
     <p:spTree>
@@ -19677,7 +20038,7 @@
 </p:sld>
 </file>
 
-<file path=ppt/slides/slide13.xml><?xml version="1.0" encoding="utf-8"?>
+<file path=ppt/slides/slide14.xml><?xml version="1.0" encoding="utf-8"?>
 <p:sld xmlns:a="http://schemas.openxmlformats.org/drawingml/2006/main" xmlns:r="http://schemas.openxmlformats.org/officeDocument/2006/relationships" xmlns:p="http://schemas.openxmlformats.org/presentationml/2006/main">
   <p:cSld>
     <p:spTree>
@@ -19719,7 +20080,7 @@
 </p:sld>
 </file>
 
-<file path=ppt/slides/slide14.xml><?xml version="1.0" encoding="utf-8"?>
+<file path=ppt/slides/slide15.xml><?xml version="1.0" encoding="utf-8"?>
 <p:sld xmlns:a="http://schemas.openxmlformats.org/drawingml/2006/main" xmlns:r="http://schemas.openxmlformats.org/officeDocument/2006/relationships" xmlns:p="http://schemas.openxmlformats.org/presentationml/2006/main">
   <p:cSld>
     <p:spTree>
@@ -19821,7 +20182,7 @@
 </p:sld>
 </file>
 
-<file path=ppt/slides/slide15.xml><?xml version="1.0" encoding="utf-8"?>
+<file path=ppt/slides/slide16.xml><?xml version="1.0" encoding="utf-8"?>
 <p:sld xmlns:a="http://schemas.openxmlformats.org/drawingml/2006/main" xmlns:r="http://schemas.openxmlformats.org/officeDocument/2006/relationships" xmlns:p="http://schemas.openxmlformats.org/presentationml/2006/main">
   <p:cSld>
     <p:spTree>
@@ -20067,6 +20428,551 @@
         </p:nvSpPr>
         <p:spPr>
           <a:xfrm>
+            <a:off x="386900" y="762000"/>
+            <a:ext cx="4576810" cy="762000"/>
+          </a:xfrm>
+        </p:spPr>
+        <p:txBody>
+          <a:bodyPr/>
+          <a:lstStyle/>
+          <a:p>
+            <a:r>
+              <a:rPr lang="en-US" dirty="0"/>
+              <a:t>Decision Tree Model</a:t>
+            </a:r>
+          </a:p>
+        </p:txBody>
+      </p:sp>
+      <p:sp>
+        <p:nvSpPr>
+          <p:cNvPr id="14" name="Content Placeholder 13"/>
+          <p:cNvSpPr>
+            <a:spLocks noGrp="1"/>
+          </p:cNvSpPr>
+          <p:nvPr>
+            <p:ph idx="1"/>
+          </p:nvPr>
+        </p:nvSpPr>
+        <p:spPr>
+          <a:xfrm>
+            <a:off x="383775" y="1905000"/>
+            <a:ext cx="4572000" cy="4114801"/>
+          </a:xfrm>
+        </p:spPr>
+        <p:txBody>
+          <a:bodyPr/>
+          <a:lstStyle/>
+          <a:p>
+            <a:r>
+              <a:rPr lang="en-US" sz="2800" dirty="0"/>
+              <a:t>Three potential targets for our marketing campaign</a:t>
+            </a:r>
+          </a:p>
+          <a:p>
+            <a:pPr marL="688975" lvl="1" indent="-457200">
+              <a:buFont typeface="+mj-lt"/>
+              <a:buAutoNum type="arabicPeriod"/>
+            </a:pPr>
+            <a:r>
+              <a:rPr lang="en-US" sz="2800" dirty="0">
+                <a:solidFill>
+                  <a:schemeClr val="accent3"/>
+                </a:solidFill>
+              </a:rPr>
+              <a:t>Infrequent Users</a:t>
+            </a:r>
+          </a:p>
+          <a:p>
+            <a:pPr marL="688975" lvl="1" indent="-457200">
+              <a:buFont typeface="+mj-lt"/>
+              <a:buAutoNum type="arabicPeriod"/>
+            </a:pPr>
+            <a:r>
+              <a:rPr lang="en-US" sz="2800" dirty="0">
+                <a:solidFill>
+                  <a:schemeClr val="bg2">
+                    <a:lumMod val="50000"/>
+                    <a:lumOff val="50000"/>
+                  </a:schemeClr>
+                </a:solidFill>
+              </a:rPr>
+              <a:t>New user with Old Equipment</a:t>
+            </a:r>
+          </a:p>
+          <a:p>
+            <a:pPr marL="688975" lvl="1" indent="-457200">
+              <a:buFont typeface="+mj-lt"/>
+              <a:buAutoNum type="arabicPeriod"/>
+            </a:pPr>
+            <a:r>
+              <a:rPr lang="en-US" sz="2800" dirty="0">
+                <a:solidFill>
+                  <a:schemeClr val="accent6">
+                    <a:lumMod val="60000"/>
+                    <a:lumOff val="40000"/>
+                  </a:schemeClr>
+                </a:solidFill>
+              </a:rPr>
+              <a:t>Frequent phone swapper</a:t>
+            </a:r>
+          </a:p>
+        </p:txBody>
+      </p:sp>
+      <p:grpSp>
+        <p:nvGrpSpPr>
+          <p:cNvPr id="17" name="Group 16">
+            <a:extLst>
+              <a:ext uri="{FF2B5EF4-FFF2-40B4-BE49-F238E27FC236}">
+                <a16:creationId xmlns:a16="http://schemas.microsoft.com/office/drawing/2014/main" id="{413C61B0-4487-4D42-8DD2-8C03FA6F4E88}"/>
+              </a:ext>
+            </a:extLst>
+          </p:cNvPr>
+          <p:cNvGrpSpPr/>
+          <p:nvPr/>
+        </p:nvGrpSpPr>
+        <p:grpSpPr>
+          <a:xfrm>
+            <a:off x="5103812" y="533400"/>
+            <a:ext cx="6565498" cy="5334000"/>
+            <a:chOff x="5256212" y="838200"/>
+            <a:chExt cx="6324600" cy="5105400"/>
+          </a:xfrm>
+        </p:grpSpPr>
+        <p:grpSp>
+          <p:nvGrpSpPr>
+            <p:cNvPr id="12" name="Group 11">
+              <a:extLst>
+                <a:ext uri="{FF2B5EF4-FFF2-40B4-BE49-F238E27FC236}">
+                  <a16:creationId xmlns:a16="http://schemas.microsoft.com/office/drawing/2014/main" id="{C08B66E1-37D5-4DFE-9329-31A8FB419AC3}"/>
+                </a:ext>
+              </a:extLst>
+            </p:cNvPr>
+            <p:cNvGrpSpPr/>
+            <p:nvPr/>
+          </p:nvGrpSpPr>
+          <p:grpSpPr>
+            <a:xfrm>
+              <a:off x="5256212" y="838200"/>
+              <a:ext cx="6324600" cy="5105400"/>
+              <a:chOff x="5103813" y="609600"/>
+              <a:chExt cx="6629400" cy="4800600"/>
+            </a:xfrm>
+          </p:grpSpPr>
+          <p:sp>
+            <p:nvSpPr>
+              <p:cNvPr id="3" name="Rectangle: Rounded Corners 2">
+                <a:extLst>
+                  <a:ext uri="{FF2B5EF4-FFF2-40B4-BE49-F238E27FC236}">
+                    <a16:creationId xmlns:a16="http://schemas.microsoft.com/office/drawing/2014/main" id="{612E3CF4-E157-4A32-B84D-EE54E327BA14}"/>
+                  </a:ext>
+                </a:extLst>
+              </p:cNvPr>
+              <p:cNvSpPr/>
+              <p:nvPr/>
+            </p:nvSpPr>
+            <p:spPr>
+              <a:xfrm>
+                <a:off x="5103813" y="609600"/>
+                <a:ext cx="6629400" cy="4800600"/>
+              </a:xfrm>
+              <a:prstGeom prst="roundRect">
+                <a:avLst>
+                  <a:gd name="adj" fmla="val 7543"/>
+                </a:avLst>
+              </a:prstGeom>
+              <a:solidFill>
+                <a:schemeClr val="tx1"/>
+              </a:solidFill>
+              <a:ln w="82550" cap="flat" cmpd="thickThin">
+                <a:gradFill>
+                  <a:gsLst>
+                    <a:gs pos="0">
+                      <a:schemeClr val="accent3"/>
+                    </a:gs>
+                    <a:gs pos="33000">
+                      <a:schemeClr val="bg2">
+                        <a:lumMod val="50000"/>
+                        <a:lumOff val="50000"/>
+                      </a:schemeClr>
+                    </a:gs>
+                    <a:gs pos="71000">
+                      <a:schemeClr val="bg2">
+                        <a:lumMod val="75000"/>
+                        <a:lumOff val="25000"/>
+                      </a:schemeClr>
+                    </a:gs>
+                    <a:gs pos="100000">
+                      <a:schemeClr val="accent3"/>
+                    </a:gs>
+                  </a:gsLst>
+                  <a:lin ang="5400000" scaled="1"/>
+                </a:gradFill>
+                <a:miter lim="800000"/>
+              </a:ln>
+            </p:spPr>
+            <p:style>
+              <a:lnRef idx="2">
+                <a:schemeClr val="accent1">
+                  <a:shade val="50000"/>
+                </a:schemeClr>
+              </a:lnRef>
+              <a:fillRef idx="1">
+                <a:schemeClr val="accent1"/>
+              </a:fillRef>
+              <a:effectRef idx="0">
+                <a:schemeClr val="accent1"/>
+              </a:effectRef>
+              <a:fontRef idx="minor">
+                <a:schemeClr val="lt1"/>
+              </a:fontRef>
+            </p:style>
+            <p:txBody>
+              <a:bodyPr rtlCol="0" anchor="ctr"/>
+              <a:lstStyle/>
+              <a:p>
+                <a:pPr algn="ctr"/>
+                <a:endParaRPr lang="en-US"/>
+              </a:p>
+            </p:txBody>
+          </p:sp>
+          <p:grpSp>
+            <p:nvGrpSpPr>
+              <p:cNvPr id="8" name="Group 7">
+                <a:extLst>
+                  <a:ext uri="{FF2B5EF4-FFF2-40B4-BE49-F238E27FC236}">
+                    <a16:creationId xmlns:a16="http://schemas.microsoft.com/office/drawing/2014/main" id="{4CC97478-21CC-45D8-8ACD-E0A11093CF17}"/>
+                  </a:ext>
+                </a:extLst>
+              </p:cNvPr>
+              <p:cNvGrpSpPr/>
+              <p:nvPr/>
+            </p:nvGrpSpPr>
+            <p:grpSpPr>
+              <a:xfrm>
+                <a:off x="5236734" y="1150150"/>
+                <a:ext cx="6363558" cy="3726650"/>
+                <a:chOff x="5236734" y="609600"/>
+                <a:chExt cx="6363558" cy="3726650"/>
+              </a:xfrm>
+            </p:grpSpPr>
+            <p:pic>
+              <p:nvPicPr>
+                <p:cNvPr id="4" name="Picture 3">
+                  <a:extLst>
+                    <a:ext uri="{FF2B5EF4-FFF2-40B4-BE49-F238E27FC236}">
+                      <a16:creationId xmlns:a16="http://schemas.microsoft.com/office/drawing/2014/main" id="{FC6818CB-1273-436F-8913-BE42B00D33BC}"/>
+                    </a:ext>
+                  </a:extLst>
+                </p:cNvPr>
+                <p:cNvPicPr>
+                  <a:picLocks noChangeAspect="1"/>
+                </p:cNvPicPr>
+                <p:nvPr/>
+              </p:nvPicPr>
+              <p:blipFill>
+                <a:blip r:embed="rId2"/>
+                <a:stretch>
+                  <a:fillRect/>
+                </a:stretch>
+              </p:blipFill>
+              <p:spPr>
+                <a:xfrm>
+                  <a:off x="5236734" y="609600"/>
+                  <a:ext cx="6363558" cy="3726650"/>
+                </a:xfrm>
+                <a:prstGeom prst="rect">
+                  <a:avLst/>
+                </a:prstGeom>
+              </p:spPr>
+            </p:pic>
+            <p:sp>
+              <p:nvSpPr>
+                <p:cNvPr id="10" name="Rectangle: Rounded Corners 9">
+                  <a:extLst>
+                    <a:ext uri="{FF2B5EF4-FFF2-40B4-BE49-F238E27FC236}">
+                      <a16:creationId xmlns:a16="http://schemas.microsoft.com/office/drawing/2014/main" id="{9BDF47C6-218F-4162-80CC-03D0986CE82D}"/>
+                    </a:ext>
+                  </a:extLst>
+                </p:cNvPr>
+                <p:cNvSpPr/>
+                <p:nvPr/>
+              </p:nvSpPr>
+              <p:spPr>
+                <a:xfrm>
+                  <a:off x="10658904" y="2286000"/>
+                  <a:ext cx="889713" cy="343292"/>
+                </a:xfrm>
+                <a:prstGeom prst="roundRect">
+                  <a:avLst>
+                    <a:gd name="adj" fmla="val 27922"/>
+                  </a:avLst>
+                </a:prstGeom>
+                <a:solidFill>
+                  <a:schemeClr val="accent3">
+                    <a:alpha val="20000"/>
+                  </a:schemeClr>
+                </a:solidFill>
+                <a:ln w="38100">
+                  <a:solidFill>
+                    <a:srgbClr val="FFC000"/>
+                  </a:solidFill>
+                </a:ln>
+              </p:spPr>
+              <p:style>
+                <a:lnRef idx="2">
+                  <a:schemeClr val="accent1">
+                    <a:shade val="50000"/>
+                  </a:schemeClr>
+                </a:lnRef>
+                <a:fillRef idx="1">
+                  <a:schemeClr val="accent1"/>
+                </a:fillRef>
+                <a:effectRef idx="0">
+                  <a:schemeClr val="accent1"/>
+                </a:effectRef>
+                <a:fontRef idx="minor">
+                  <a:schemeClr val="lt1"/>
+                </a:fontRef>
+              </p:style>
+              <p:txBody>
+                <a:bodyPr rtlCol="0" anchor="ctr"/>
+                <a:lstStyle/>
+                <a:p>
+                  <a:pPr algn="ctr"/>
+                  <a:endParaRPr lang="en-US"/>
+                </a:p>
+              </p:txBody>
+            </p:sp>
+            <p:sp>
+              <p:nvSpPr>
+                <p:cNvPr id="11" name="Rectangle: Rounded Corners 10">
+                  <a:extLst>
+                    <a:ext uri="{FF2B5EF4-FFF2-40B4-BE49-F238E27FC236}">
+                      <a16:creationId xmlns:a16="http://schemas.microsoft.com/office/drawing/2014/main" id="{F6C31AC1-C88C-428F-8D6E-169EA8C9C5DD}"/>
+                    </a:ext>
+                  </a:extLst>
+                </p:cNvPr>
+                <p:cNvSpPr/>
+                <p:nvPr/>
+              </p:nvSpPr>
+              <p:spPr>
+                <a:xfrm>
+                  <a:off x="10209212" y="3085708"/>
+                  <a:ext cx="762000" cy="343292"/>
+                </a:xfrm>
+                <a:prstGeom prst="roundRect">
+                  <a:avLst>
+                    <a:gd name="adj" fmla="val 27922"/>
+                  </a:avLst>
+                </a:prstGeom>
+                <a:noFill/>
+                <a:ln w="38100">
+                  <a:solidFill>
+                    <a:srgbClr val="FFC000"/>
+                  </a:solidFill>
+                </a:ln>
+              </p:spPr>
+              <p:style>
+                <a:lnRef idx="2">
+                  <a:schemeClr val="accent1">
+                    <a:shade val="50000"/>
+                  </a:schemeClr>
+                </a:lnRef>
+                <a:fillRef idx="1">
+                  <a:schemeClr val="accent1"/>
+                </a:fillRef>
+                <a:effectRef idx="0">
+                  <a:schemeClr val="accent1"/>
+                </a:effectRef>
+                <a:fontRef idx="minor">
+                  <a:schemeClr val="lt1"/>
+                </a:fontRef>
+              </p:style>
+              <p:txBody>
+                <a:bodyPr rtlCol="0" anchor="ctr"/>
+                <a:lstStyle/>
+                <a:p>
+                  <a:pPr algn="ctr"/>
+                  <a:endParaRPr lang="en-US"/>
+                </a:p>
+              </p:txBody>
+            </p:sp>
+          </p:grpSp>
+        </p:grpSp>
+        <p:sp>
+          <p:nvSpPr>
+            <p:cNvPr id="15" name="Rectangle: Rounded Corners 14">
+              <a:extLst>
+                <a:ext uri="{FF2B5EF4-FFF2-40B4-BE49-F238E27FC236}">
+                  <a16:creationId xmlns:a16="http://schemas.microsoft.com/office/drawing/2014/main" id="{5D19C6AF-4893-4E14-8FA0-4AD45A71FD9C}"/>
+                </a:ext>
+              </a:extLst>
+            </p:cNvPr>
+            <p:cNvSpPr/>
+            <p:nvPr/>
+          </p:nvSpPr>
+          <p:spPr>
+            <a:xfrm>
+              <a:off x="10121000" y="4046392"/>
+              <a:ext cx="732847" cy="365088"/>
+            </a:xfrm>
+            <a:prstGeom prst="roundRect">
+              <a:avLst>
+                <a:gd name="adj" fmla="val 27922"/>
+              </a:avLst>
+            </a:prstGeom>
+            <a:solidFill>
+              <a:schemeClr val="accent1">
+                <a:alpha val="20000"/>
+              </a:schemeClr>
+            </a:solidFill>
+            <a:ln w="38100">
+              <a:solidFill>
+                <a:schemeClr val="bg2">
+                  <a:lumMod val="50000"/>
+                  <a:lumOff val="50000"/>
+                </a:schemeClr>
+              </a:solidFill>
+            </a:ln>
+          </p:spPr>
+          <p:style>
+            <a:lnRef idx="2">
+              <a:schemeClr val="accent1">
+                <a:shade val="50000"/>
+              </a:schemeClr>
+            </a:lnRef>
+            <a:fillRef idx="1">
+              <a:schemeClr val="accent1"/>
+            </a:fillRef>
+            <a:effectRef idx="0">
+              <a:schemeClr val="accent1"/>
+            </a:effectRef>
+            <a:fontRef idx="minor">
+              <a:schemeClr val="lt1"/>
+            </a:fontRef>
+          </p:style>
+          <p:txBody>
+            <a:bodyPr rtlCol="0" anchor="ctr"/>
+            <a:lstStyle/>
+            <a:p>
+              <a:pPr algn="ctr"/>
+              <a:endParaRPr lang="en-US"/>
+            </a:p>
+          </p:txBody>
+        </p:sp>
+        <p:sp>
+          <p:nvSpPr>
+            <p:cNvPr id="16" name="Rectangle: Rounded Corners 15">
+              <a:extLst>
+                <a:ext uri="{FF2B5EF4-FFF2-40B4-BE49-F238E27FC236}">
+                  <a16:creationId xmlns:a16="http://schemas.microsoft.com/office/drawing/2014/main" id="{77701781-5D7C-46D0-A8F0-DC795B4E6F01}"/>
+                </a:ext>
+              </a:extLst>
+            </p:cNvPr>
+            <p:cNvSpPr/>
+            <p:nvPr/>
+          </p:nvSpPr>
+          <p:spPr>
+            <a:xfrm>
+              <a:off x="8452996" y="4046392"/>
+              <a:ext cx="746762" cy="365088"/>
+            </a:xfrm>
+            <a:prstGeom prst="roundRect">
+              <a:avLst>
+                <a:gd name="adj" fmla="val 27922"/>
+              </a:avLst>
+            </a:prstGeom>
+            <a:solidFill>
+              <a:schemeClr val="accent4">
+                <a:alpha val="20000"/>
+              </a:schemeClr>
+            </a:solidFill>
+            <a:ln w="38100">
+              <a:solidFill>
+                <a:schemeClr val="accent4"/>
+              </a:solidFill>
+            </a:ln>
+          </p:spPr>
+          <p:style>
+            <a:lnRef idx="2">
+              <a:schemeClr val="accent1">
+                <a:shade val="50000"/>
+              </a:schemeClr>
+            </a:lnRef>
+            <a:fillRef idx="1">
+              <a:schemeClr val="accent1"/>
+            </a:fillRef>
+            <a:effectRef idx="0">
+              <a:schemeClr val="accent1"/>
+            </a:effectRef>
+            <a:fontRef idx="minor">
+              <a:schemeClr val="lt1"/>
+            </a:fontRef>
+          </p:style>
+          <p:txBody>
+            <a:bodyPr rtlCol="0" anchor="ctr"/>
+            <a:lstStyle/>
+            <a:p>
+              <a:pPr algn="ctr"/>
+              <a:endParaRPr lang="en-US"/>
+            </a:p>
+          </p:txBody>
+        </p:sp>
+      </p:grpSp>
+    </p:spTree>
+    <p:extLst>
+      <p:ext uri="{BB962C8B-B14F-4D97-AF65-F5344CB8AC3E}">
+        <p14:creationId xmlns:p14="http://schemas.microsoft.com/office/powerpoint/2010/main" val="312347104"/>
+      </p:ext>
+    </p:extLst>
+  </p:cSld>
+  <p:clrMapOvr>
+    <a:masterClrMapping/>
+  </p:clrMapOvr>
+  <mc:AlternateContent xmlns:mc="http://schemas.openxmlformats.org/markup-compatibility/2006" xmlns:p14="http://schemas.microsoft.com/office/powerpoint/2010/main">
+    <mc:Choice Requires="p14">
+      <p:transition spd="med" p14:dur="700">
+        <p:fade/>
+      </p:transition>
+    </mc:Choice>
+    <mc:Fallback xmlns="">
+      <p:transition spd="med">
+        <p:fade/>
+      </p:transition>
+    </mc:Fallback>
+  </mc:AlternateContent>
+</p:sld>
+</file>
+
+<file path=ppt/slides/slide4.xml><?xml version="1.0" encoding="utf-8"?>
+<p:sld xmlns:a="http://schemas.openxmlformats.org/drawingml/2006/main" xmlns:r="http://schemas.openxmlformats.org/officeDocument/2006/relationships" xmlns:p="http://schemas.openxmlformats.org/presentationml/2006/main">
+  <p:cSld>
+    <p:spTree>
+      <p:nvGrpSpPr>
+        <p:cNvPr id="1" name=""/>
+        <p:cNvGrpSpPr/>
+        <p:nvPr/>
+      </p:nvGrpSpPr>
+      <p:grpSpPr>
+        <a:xfrm>
+          <a:off x="0" y="0"/>
+          <a:ext cx="0" cy="0"/>
+          <a:chOff x="0" y="0"/>
+          <a:chExt cx="0" cy="0"/>
+        </a:xfrm>
+      </p:grpSpPr>
+      <p:sp>
+        <p:nvSpPr>
+          <p:cNvPr id="13" name="Title 12"/>
+          <p:cNvSpPr>
+            <a:spLocks noGrp="1"/>
+          </p:cNvSpPr>
+          <p:nvPr>
+            <p:ph type="title"/>
+          </p:nvPr>
+        </p:nvSpPr>
+        <p:spPr>
+          <a:xfrm>
             <a:off x="950912" y="73152"/>
             <a:ext cx="9144001" cy="1371600"/>
           </a:xfrm>
@@ -20092,13 +20998,13 @@
             <p:ph idx="1"/>
             <p:extLst>
               <p:ext uri="{D42A27DB-BD31-4B8C-83A1-F6EECF244321}">
-                <p14:modId xmlns:p14="http://schemas.microsoft.com/office/powerpoint/2010/main" val="1202351841"/>
+                <p14:modId xmlns:p14="http://schemas.microsoft.com/office/powerpoint/2010/main" val="325121720"/>
               </p:ext>
             </p:extLst>
           </p:nvPr>
         </p:nvGraphicFramePr>
         <p:xfrm>
-          <a:off x="950912" y="1752600"/>
+          <a:off x="531812" y="1752600"/>
           <a:ext cx="10287000" cy="4648200"/>
         </p:xfrm>
         <a:graphic>
@@ -20179,6 +21085,36 @@
           </a:p>
         </p:txBody>
       </p:sp>
+      <p:pic>
+        <p:nvPicPr>
+          <p:cNvPr id="4" name="Picture 3">
+            <a:extLst>
+              <a:ext uri="{FF2B5EF4-FFF2-40B4-BE49-F238E27FC236}">
+                <a16:creationId xmlns:a16="http://schemas.microsoft.com/office/drawing/2014/main" id="{3BC0109A-AF8F-4C1D-9FE5-AC5826C2CD88}"/>
+              </a:ext>
+            </a:extLst>
+          </p:cNvPr>
+          <p:cNvPicPr>
+            <a:picLocks noChangeAspect="1"/>
+          </p:cNvPicPr>
+          <p:nvPr/>
+        </p:nvPicPr>
+        <p:blipFill>
+          <a:blip r:embed="rId7"/>
+          <a:stretch>
+            <a:fillRect/>
+          </a:stretch>
+        </p:blipFill>
+        <p:spPr>
+          <a:xfrm>
+            <a:off x="9142412" y="73152"/>
+            <a:ext cx="2947858" cy="2402059"/>
+          </a:xfrm>
+          <a:prstGeom prst="rect">
+            <a:avLst/>
+          </a:prstGeom>
+        </p:spPr>
+      </p:pic>
     </p:spTree>
     <p:extLst>
       <p:ext uri="{BB962C8B-B14F-4D97-AF65-F5344CB8AC3E}">
@@ -20204,7 +21140,7 @@
 </p:sld>
 </file>
 
-<file path=ppt/slides/slide4.xml><?xml version="1.0" encoding="utf-8"?>
+<file path=ppt/slides/slide5.xml><?xml version="1.0" encoding="utf-8"?>
 <p:sld xmlns:a="http://schemas.openxmlformats.org/drawingml/2006/main" xmlns:r="http://schemas.openxmlformats.org/officeDocument/2006/relationships" xmlns:p="http://schemas.openxmlformats.org/presentationml/2006/main">
   <p:cSld>
     <p:spTree>
@@ -20221,6 +21157,36 @@
           <a:chExt cx="0" cy="0"/>
         </a:xfrm>
       </p:grpSpPr>
+      <p:pic>
+        <p:nvPicPr>
+          <p:cNvPr id="4" name="Picture 3">
+            <a:extLst>
+              <a:ext uri="{FF2B5EF4-FFF2-40B4-BE49-F238E27FC236}">
+                <a16:creationId xmlns:a16="http://schemas.microsoft.com/office/drawing/2014/main" id="{980FB3C1-BE6F-4E4B-90D4-BBE9FBC5DB55}"/>
+              </a:ext>
+            </a:extLst>
+          </p:cNvPr>
+          <p:cNvPicPr>
+            <a:picLocks noChangeAspect="1"/>
+          </p:cNvPicPr>
+          <p:nvPr/>
+        </p:nvPicPr>
+        <p:blipFill>
+          <a:blip r:embed="rId2"/>
+          <a:stretch>
+            <a:fillRect/>
+          </a:stretch>
+        </p:blipFill>
+        <p:spPr>
+          <a:xfrm>
+            <a:off x="9142412" y="73152"/>
+            <a:ext cx="2951311" cy="2404872"/>
+          </a:xfrm>
+          <a:prstGeom prst="rect">
+            <a:avLst/>
+          </a:prstGeom>
+        </p:spPr>
+      </p:pic>
       <p:sp>
         <p:nvSpPr>
           <p:cNvPr id="13" name="Title 12"/>
@@ -20243,7 +21209,14 @@
           <a:p>
             <a:r>
               <a:rPr lang="en-US" dirty="0"/>
-              <a:t>Promotional Program for Group 7: New User with Old Equipment</a:t>
+              <a:t>Promotional Program for Group 7: </a:t>
+            </a:r>
+            <a:br>
+              <a:rPr lang="en-US" dirty="0"/>
+            </a:br>
+            <a:r>
+              <a:rPr lang="en-US" dirty="0"/>
+              <a:t>New User with Old Equipment</a:t>
             </a:r>
           </a:p>
         </p:txBody>
@@ -20258,18 +21231,18 @@
             <p:ph idx="1"/>
             <p:extLst>
               <p:ext uri="{D42A27DB-BD31-4B8C-83A1-F6EECF244321}">
-                <p14:modId xmlns:p14="http://schemas.microsoft.com/office/powerpoint/2010/main" val="2996754013"/>
+                <p14:modId xmlns:p14="http://schemas.microsoft.com/office/powerpoint/2010/main" val="319578461"/>
               </p:ext>
             </p:extLst>
           </p:nvPr>
         </p:nvGraphicFramePr>
         <p:xfrm>
-          <a:off x="950912" y="1752600"/>
+          <a:off x="531812" y="1752600"/>
           <a:ext cx="10287000" cy="4648200"/>
         </p:xfrm>
         <a:graphic>
           <a:graphicData uri="http://schemas.openxmlformats.org/drawingml/2006/diagram">
-            <dgm:relIds xmlns:dgm="http://schemas.openxmlformats.org/drawingml/2006/diagram" xmlns:r="http://schemas.openxmlformats.org/officeDocument/2006/relationships" r:dm="rId2" r:lo="rId3" r:qs="rId4" r:cs="rId5"/>
+            <dgm:relIds xmlns:dgm="http://schemas.openxmlformats.org/drawingml/2006/diagram" xmlns:r="http://schemas.openxmlformats.org/officeDocument/2006/relationships" r:dm="rId3" r:lo="rId4" r:qs="rId5" r:cs="rId6"/>
           </a:graphicData>
         </a:graphic>
       </p:graphicFrame>
@@ -20287,7 +21260,7 @@
         </p:nvSpPr>
         <p:spPr>
           <a:xfrm>
-            <a:off x="8532812" y="4081780"/>
+            <a:off x="8151812" y="4076700"/>
             <a:ext cx="2362202" cy="609600"/>
           </a:xfrm>
           <a:prstGeom prst="rect">
@@ -20370,7 +21343,7 @@
 </p:sld>
 </file>
 
-<file path=ppt/slides/slide5.xml><?xml version="1.0" encoding="utf-8"?>
+<file path=ppt/slides/slide6.xml><?xml version="1.0" encoding="utf-8"?>
 <p:sld xmlns:a="http://schemas.openxmlformats.org/drawingml/2006/main" xmlns:r="http://schemas.openxmlformats.org/officeDocument/2006/relationships" xmlns:p="http://schemas.openxmlformats.org/presentationml/2006/main">
   <p:cSld>
     <p:spTree>
@@ -20387,6 +21360,36 @@
           <a:chExt cx="0" cy="0"/>
         </a:xfrm>
       </p:grpSpPr>
+      <p:pic>
+        <p:nvPicPr>
+          <p:cNvPr id="4" name="Picture 3">
+            <a:extLst>
+              <a:ext uri="{FF2B5EF4-FFF2-40B4-BE49-F238E27FC236}">
+                <a16:creationId xmlns:a16="http://schemas.microsoft.com/office/drawing/2014/main" id="{2369E768-4B41-4D89-AFBA-F649EADE7A38}"/>
+              </a:ext>
+            </a:extLst>
+          </p:cNvPr>
+          <p:cNvPicPr>
+            <a:picLocks noChangeAspect="1"/>
+          </p:cNvPicPr>
+          <p:nvPr/>
+        </p:nvPicPr>
+        <p:blipFill>
+          <a:blip r:embed="rId2"/>
+          <a:stretch>
+            <a:fillRect/>
+          </a:stretch>
+        </p:blipFill>
+        <p:spPr>
+          <a:xfrm>
+            <a:off x="9142412" y="82579"/>
+            <a:ext cx="2951310" cy="2404872"/>
+          </a:xfrm>
+          <a:prstGeom prst="rect">
+            <a:avLst/>
+          </a:prstGeom>
+        </p:spPr>
+      </p:pic>
       <p:sp>
         <p:nvSpPr>
           <p:cNvPr id="13" name="Title 12"/>
@@ -20409,7 +21412,14 @@
           <a:p>
             <a:r>
               <a:rPr lang="en-US" dirty="0"/>
-              <a:t>Promotional Program for Group 11: Frequent Phone Swapper</a:t>
+              <a:t>Promotional Program for Group 11: </a:t>
+            </a:r>
+            <a:br>
+              <a:rPr lang="en-US" dirty="0"/>
+            </a:br>
+            <a:r>
+              <a:rPr lang="en-US" dirty="0"/>
+              <a:t>Frequent Phone Swapper</a:t>
             </a:r>
           </a:p>
         </p:txBody>
@@ -20424,18 +21434,18 @@
             <p:ph idx="1"/>
             <p:extLst>
               <p:ext uri="{D42A27DB-BD31-4B8C-83A1-F6EECF244321}">
-                <p14:modId xmlns:p14="http://schemas.microsoft.com/office/powerpoint/2010/main" val="1475068877"/>
+                <p14:modId xmlns:p14="http://schemas.microsoft.com/office/powerpoint/2010/main" val="4196681993"/>
               </p:ext>
             </p:extLst>
           </p:nvPr>
         </p:nvGraphicFramePr>
         <p:xfrm>
-          <a:off x="950912" y="1752600"/>
+          <a:off x="531812" y="1752600"/>
           <a:ext cx="10287000" cy="4648200"/>
         </p:xfrm>
         <a:graphic>
           <a:graphicData uri="http://schemas.openxmlformats.org/drawingml/2006/diagram">
-            <dgm:relIds xmlns:dgm="http://schemas.openxmlformats.org/drawingml/2006/diagram" xmlns:r="http://schemas.openxmlformats.org/officeDocument/2006/relationships" r:dm="rId2" r:lo="rId3" r:qs="rId4" r:cs="rId5"/>
+            <dgm:relIds xmlns:dgm="http://schemas.openxmlformats.org/drawingml/2006/diagram" xmlns:r="http://schemas.openxmlformats.org/officeDocument/2006/relationships" r:dm="rId3" r:lo="rId4" r:qs="rId5" r:cs="rId6"/>
           </a:graphicData>
         </a:graphic>
       </p:graphicFrame>
@@ -20536,7 +21546,7 @@
 </p:sld>
 </file>
 
-<file path=ppt/slides/slide6.xml><?xml version="1.0" encoding="utf-8"?>
+<file path=ppt/slides/slide7.xml><?xml version="1.0" encoding="utf-8"?>
 <p:sld xmlns:a="http://schemas.openxmlformats.org/drawingml/2006/main" xmlns:r="http://schemas.openxmlformats.org/officeDocument/2006/relationships" xmlns:p="http://schemas.openxmlformats.org/presentationml/2006/main">
   <p:cSld>
     <p:spTree>
@@ -20609,7 +21619,7 @@
 </p:sld>
 </file>
 
-<file path=ppt/slides/slide7.xml><?xml version="1.0" encoding="utf-8"?>
+<file path=ppt/slides/slide8.xml><?xml version="1.0" encoding="utf-8"?>
 <p:sld xmlns:a="http://schemas.openxmlformats.org/drawingml/2006/main" xmlns:r="http://schemas.openxmlformats.org/officeDocument/2006/relationships" xmlns:p="http://schemas.openxmlformats.org/presentationml/2006/main">
   <p:cSld>
     <p:spTree>
@@ -20701,7 +21711,7 @@
 </p:sld>
 </file>
 
-<file path=ppt/slides/slide8.xml><?xml version="1.0" encoding="utf-8"?>
+<file path=ppt/slides/slide9.xml><?xml version="1.0" encoding="utf-8"?>
 <p:sld xmlns:a="http://schemas.openxmlformats.org/drawingml/2006/main" xmlns:r="http://schemas.openxmlformats.org/officeDocument/2006/relationships" xmlns:p="http://schemas.openxmlformats.org/presentationml/2006/main">
   <p:cSld>
     <p:spTree>
@@ -21027,95 +22037,6 @@
     <p:extLst>
       <p:ext uri="{BB962C8B-B14F-4D97-AF65-F5344CB8AC3E}">
         <p14:creationId xmlns:p14="http://schemas.microsoft.com/office/powerpoint/2010/main" val="4206988261"/>
-      </p:ext>
-    </p:extLst>
-  </p:cSld>
-  <p:clrMapOvr>
-    <a:masterClrMapping/>
-  </p:clrMapOvr>
-  <mc:AlternateContent xmlns:mc="http://schemas.openxmlformats.org/markup-compatibility/2006" xmlns:p14="http://schemas.microsoft.com/office/powerpoint/2010/main">
-    <mc:Choice Requires="p14">
-      <p:transition spd="med" p14:dur="700">
-        <p:fade/>
-      </p:transition>
-    </mc:Choice>
-    <mc:Fallback xmlns="">
-      <p:transition spd="med">
-        <p:fade/>
-      </p:transition>
-    </mc:Fallback>
-  </mc:AlternateContent>
-</p:sld>
-</file>
-
-<file path=ppt/slides/slide9.xml><?xml version="1.0" encoding="utf-8"?>
-<p:sld xmlns:a="http://schemas.openxmlformats.org/drawingml/2006/main" xmlns:r="http://schemas.openxmlformats.org/officeDocument/2006/relationships" xmlns:p="http://schemas.openxmlformats.org/presentationml/2006/main">
-  <p:cSld>
-    <p:spTree>
-      <p:nvGrpSpPr>
-        <p:cNvPr id="1" name=""/>
-        <p:cNvGrpSpPr/>
-        <p:nvPr/>
-      </p:nvGrpSpPr>
-      <p:grpSpPr>
-        <a:xfrm>
-          <a:off x="0" y="0"/>
-          <a:ext cx="0" cy="0"/>
-          <a:chOff x="0" y="0"/>
-          <a:chExt cx="0" cy="0"/>
-        </a:xfrm>
-      </p:grpSpPr>
-      <p:sp>
-        <p:nvSpPr>
-          <p:cNvPr id="13" name="Title 12"/>
-          <p:cNvSpPr>
-            <a:spLocks noGrp="1"/>
-          </p:cNvSpPr>
-          <p:nvPr>
-            <p:ph type="title"/>
-          </p:nvPr>
-        </p:nvSpPr>
-        <p:spPr/>
-        <p:txBody>
-          <a:bodyPr/>
-          <a:lstStyle/>
-          <a:p>
-            <a:r>
-              <a:rPr lang="en-US" dirty="0"/>
-              <a:t>Title and Content Layout with SmartArt</a:t>
-            </a:r>
-          </a:p>
-        </p:txBody>
-      </p:sp>
-      <p:graphicFrame>
-        <p:nvGraphicFramePr>
-          <p:cNvPr id="3" name="Content Placeholder 2" descr="Alternating Flow diagram showing 3 groups arranged from left to right with a title and bullet points in each group and a curved arrow showing the flow from one group to the next."/>
-          <p:cNvGraphicFramePr>
-            <a:graphicFrameLocks noGrp="1"/>
-          </p:cNvGraphicFramePr>
-          <p:nvPr>
-            <p:ph idx="1"/>
-            <p:extLst>
-              <p:ext uri="{D42A27DB-BD31-4B8C-83A1-F6EECF244321}">
-                <p14:modId xmlns:p14="http://schemas.microsoft.com/office/powerpoint/2010/main" val="2718408119"/>
-              </p:ext>
-            </p:extLst>
-          </p:nvPr>
-        </p:nvGraphicFramePr>
-        <p:xfrm>
-          <a:off x="1522413" y="1905000"/>
-          <a:ext cx="9134475" cy="4114800"/>
-        </p:xfrm>
-        <a:graphic>
-          <a:graphicData uri="http://schemas.openxmlformats.org/drawingml/2006/diagram">
-            <dgm:relIds xmlns:dgm="http://schemas.openxmlformats.org/drawingml/2006/diagram" xmlns:r="http://schemas.openxmlformats.org/officeDocument/2006/relationships" r:dm="rId2" r:lo="rId3" r:qs="rId4" r:cs="rId5"/>
-          </a:graphicData>
-        </a:graphic>
-      </p:graphicFrame>
-    </p:spTree>
-    <p:extLst>
-      <p:ext uri="{BB962C8B-B14F-4D97-AF65-F5344CB8AC3E}">
-        <p14:creationId xmlns:p14="http://schemas.microsoft.com/office/powerpoint/2010/main" val="462238070"/>
       </p:ext>
     </p:extLst>
   </p:cSld>

</xml_diff>